<commit_message>
Publish v1 of Jibres Investment pack
</commit_message>
<xml_diff>
--- a/business/pitch-deck/v1/Jibres-PitchDeck-v1.pptx
+++ b/business/pitch-deck/v1/Jibres-PitchDeck-v1.pptx
@@ -15630,7 +15630,7 @@
           </a:pPr>
           <a:r>
             <a:rPr lang="fa-IR" sz="1600" b="1" dirty="0"/>
-            <a:t>۱۵ میلیارد تومان</a:t>
+            <a:t>۲۰ میلیارد تومان</a:t>
           </a:r>
           <a:endParaRPr lang="en-US" sz="1600" b="1" dirty="0"/>
         </a:p>
@@ -22406,7 +22406,7 @@
           </a:pPr>
           <a:r>
             <a:rPr lang="fa-IR" sz="1600" b="1" kern="1200" dirty="0"/>
-            <a:t>۱۵ میلیارد تومان</a:t>
+            <a:t>۲۰ میلیارد تومان</a:t>
           </a:r>
           <a:endParaRPr lang="en-US" sz="1600" b="1" kern="1200" dirty="0"/>
         </a:p>
@@ -32693,7 +32693,7 @@
           <a:p>
             <a:fld id="{4BCE15A7-A56F-4E25-873C-50B597AA8420}" type="datetimeFigureOut">
               <a:rPr lang="en-US" smtClean="0"/>
-              <a:t>2021-05-21</a:t>
+              <a:t>2021-05-23</a:t>
             </a:fld>
             <a:endParaRPr lang="en-US"/>
           </a:p>
@@ -32870,7 +32870,7 @@
           <a:p>
             <a:fld id="{62C1A832-66EE-44A0-BEBE-A62E02B5B452}" type="datetimeFigureOut">
               <a:rPr lang="en-US" smtClean="0"/>
-              <a:t>2021-05-21</a:t>
+              <a:t>2021-05-23</a:t>
             </a:fld>
             <a:endParaRPr lang="en-US"/>
           </a:p>
@@ -47163,7 +47163,7 @@
             <p:ph sz="half" idx="2"/>
             <p:extLst>
               <p:ext uri="{D42A27DB-BD31-4B8C-83A1-F6EECF244321}">
-                <p14:modId xmlns:p14="http://schemas.microsoft.com/office/powerpoint/2010/main" val="3362477498"/>
+                <p14:modId xmlns:p14="http://schemas.microsoft.com/office/powerpoint/2010/main" val="1724955825"/>
               </p:ext>
             </p:extLst>
           </p:nvPr>

</xml_diff>